<commit_message>
simplify reference_doc for calm theme
</commit_message>
<xml_diff>
--- a/inst/rmarkdown/templates/pptxtemplates---calm/skeleton/reference_doc.pptx
+++ b/inst/rmarkdown/templates/pptxtemplates---calm/skeleton/reference_doc.pptx
@@ -434,412 +434,6 @@
 </p:sldLayout>
 </file>
 
-<file path=ppt/slideLayouts/slideLayout10.xml><?xml version="1.0" encoding="utf-8"?>
-<p:sldLayout xmlns:a="http://schemas.openxmlformats.org/drawingml/2006/main" xmlns:r="http://schemas.openxmlformats.org/officeDocument/2006/relationships" xmlns:p="http://schemas.openxmlformats.org/presentationml/2006/main" type="vertTx" preserve="1">
-  <p:cSld name="Title and Vertical Text">
-    <p:spTree>
-      <p:nvGrpSpPr>
-        <p:cNvPr id="1" name=""/>
-        <p:cNvGrpSpPr/>
-        <p:nvPr/>
-      </p:nvGrpSpPr>
-      <p:grpSpPr>
-        <a:xfrm>
-          <a:off x="0" y="0"/>
-          <a:ext cx="0" cy="0"/>
-          <a:chOff x="0" y="0"/>
-          <a:chExt cx="0" cy="0"/>
-        </a:xfrm>
-      </p:grpSpPr>
-      <p:sp>
-        <p:nvSpPr>
-          <p:cNvPr id="2" name="Title 1">
-            <a:extLst>
-              <a:ext uri="{FF2B5EF4-FFF2-40B4-BE49-F238E27FC236}">
-                <a16:creationId xmlns:a16="http://schemas.microsoft.com/office/drawing/2014/main" id="{FE07D30F-F48C-0C4F-B644-04509438D13E}"/>
-              </a:ext>
-            </a:extLst>
-          </p:cNvPr>
-          <p:cNvSpPr>
-            <a:spLocks noGrp="1"/>
-          </p:cNvSpPr>
-          <p:nvPr>
-            <p:ph type="title"/>
-          </p:nvPr>
-        </p:nvSpPr>
-        <p:spPr/>
-        <p:txBody>
-          <a:bodyPr/>
-          <a:lstStyle/>
-          <a:p>
-            <a:r>
-              <a:rPr lang="en-US"/>
-              <a:t>Click to edit Master title style</a:t>
-            </a:r>
-          </a:p>
-        </p:txBody>
-      </p:sp>
-      <p:sp>
-        <p:nvSpPr>
-          <p:cNvPr id="3" name="Vertical Text Placeholder 2">
-            <a:extLst>
-              <a:ext uri="{FF2B5EF4-FFF2-40B4-BE49-F238E27FC236}">
-                <a16:creationId xmlns:a16="http://schemas.microsoft.com/office/drawing/2014/main" id="{FD99E502-AE4F-6F44-8027-EB7C2239F1ED}"/>
-              </a:ext>
-            </a:extLst>
-          </p:cNvPr>
-          <p:cNvSpPr>
-            <a:spLocks noGrp="1"/>
-          </p:cNvSpPr>
-          <p:nvPr>
-            <p:ph type="body" orient="vert" idx="1"/>
-          </p:nvPr>
-        </p:nvSpPr>
-        <p:spPr/>
-        <p:txBody>
-          <a:bodyPr vert="eaVert"/>
-          <a:lstStyle/>
-          <a:p>
-            <a:pPr lvl="0"/>
-            <a:r>
-              <a:rPr lang="en-US"/>
-              <a:t>Click to edit Master text styles</a:t>
-            </a:r>
-          </a:p>
-          <a:p>
-            <a:pPr lvl="1"/>
-            <a:r>
-              <a:rPr lang="en-US"/>
-              <a:t>Second level</a:t>
-            </a:r>
-          </a:p>
-          <a:p>
-            <a:pPr lvl="2"/>
-            <a:r>
-              <a:rPr lang="en-US"/>
-              <a:t>Third level</a:t>
-            </a:r>
-          </a:p>
-          <a:p>
-            <a:pPr lvl="3"/>
-            <a:r>
-              <a:rPr lang="en-US"/>
-              <a:t>Fourth level</a:t>
-            </a:r>
-          </a:p>
-          <a:p>
-            <a:pPr lvl="4"/>
-            <a:r>
-              <a:rPr lang="en-US"/>
-              <a:t>Fifth level</a:t>
-            </a:r>
-          </a:p>
-        </p:txBody>
-      </p:sp>
-      <p:sp>
-        <p:nvSpPr>
-          <p:cNvPr id="4" name="Date Placeholder 3">
-            <a:extLst>
-              <a:ext uri="{FF2B5EF4-FFF2-40B4-BE49-F238E27FC236}">
-                <a16:creationId xmlns:a16="http://schemas.microsoft.com/office/drawing/2014/main" id="{31E201DD-21E0-5E4D-B3CC-95FD44C42314}"/>
-              </a:ext>
-            </a:extLst>
-          </p:cNvPr>
-          <p:cNvSpPr>
-            <a:spLocks noGrp="1"/>
-          </p:cNvSpPr>
-          <p:nvPr>
-            <p:ph type="dt" sz="half" idx="10"/>
-          </p:nvPr>
-        </p:nvSpPr>
-        <p:spPr/>
-        <p:txBody>
-          <a:bodyPr/>
-          <a:lstStyle/>
-          <a:p>
-            <a:fld id="{241EB5C9-1307-BA42-ABA2-0BC069CD8E7F}" type="datetimeFigureOut">
-              <a:rPr lang="en-US" smtClean="0"/>
-              <a:t>4/7/21</a:t>
-            </a:fld>
-            <a:endParaRPr lang="en-US"/>
-          </a:p>
-        </p:txBody>
-      </p:sp>
-      <p:sp>
-        <p:nvSpPr>
-          <p:cNvPr id="5" name="Footer Placeholder 4">
-            <a:extLst>
-              <a:ext uri="{FF2B5EF4-FFF2-40B4-BE49-F238E27FC236}">
-                <a16:creationId xmlns:a16="http://schemas.microsoft.com/office/drawing/2014/main" id="{31037F92-0C7F-9B47-914F-7609167678CF}"/>
-              </a:ext>
-            </a:extLst>
-          </p:cNvPr>
-          <p:cNvSpPr>
-            <a:spLocks noGrp="1"/>
-          </p:cNvSpPr>
-          <p:nvPr>
-            <p:ph type="ftr" sz="quarter" idx="11"/>
-          </p:nvPr>
-        </p:nvSpPr>
-        <p:spPr/>
-        <p:txBody>
-          <a:bodyPr/>
-          <a:lstStyle/>
-          <a:p>
-            <a:endParaRPr lang="en-US"/>
-          </a:p>
-        </p:txBody>
-      </p:sp>
-      <p:sp>
-        <p:nvSpPr>
-          <p:cNvPr id="6" name="Slide Number Placeholder 5">
-            <a:extLst>
-              <a:ext uri="{FF2B5EF4-FFF2-40B4-BE49-F238E27FC236}">
-                <a16:creationId xmlns:a16="http://schemas.microsoft.com/office/drawing/2014/main" id="{8F9C8024-1912-EF44-9169-F8307DA7BAC7}"/>
-              </a:ext>
-            </a:extLst>
-          </p:cNvPr>
-          <p:cNvSpPr>
-            <a:spLocks noGrp="1"/>
-          </p:cNvSpPr>
-          <p:nvPr>
-            <p:ph type="sldNum" sz="quarter" idx="12"/>
-          </p:nvPr>
-        </p:nvSpPr>
-        <p:spPr/>
-        <p:txBody>
-          <a:bodyPr/>
-          <a:lstStyle/>
-          <a:p>
-            <a:fld id="{C5EF2332-01BF-834F-8236-50238282D533}" type="slidenum">
-              <a:rPr lang="en-US" smtClean="0"/>
-              <a:t>‹#›</a:t>
-            </a:fld>
-            <a:endParaRPr lang="en-US"/>
-          </a:p>
-        </p:txBody>
-      </p:sp>
-    </p:spTree>
-    <p:extLst>
-      <p:ext uri="{BB962C8B-B14F-4D97-AF65-F5344CB8AC3E}">
-        <p14:creationId xmlns:p14="http://schemas.microsoft.com/office/powerpoint/2010/main" val="3144744649"/>
-      </p:ext>
-    </p:extLst>
-  </p:cSld>
-  <p:clrMapOvr>
-    <a:masterClrMapping/>
-  </p:clrMapOvr>
-</p:sldLayout>
-</file>
-
-<file path=ppt/slideLayouts/slideLayout11.xml><?xml version="1.0" encoding="utf-8"?>
-<p:sldLayout xmlns:a="http://schemas.openxmlformats.org/drawingml/2006/main" xmlns:r="http://schemas.openxmlformats.org/officeDocument/2006/relationships" xmlns:p="http://schemas.openxmlformats.org/presentationml/2006/main" type="vertTitleAndTx" preserve="1">
-  <p:cSld name="Vertical Title and Text">
-    <p:spTree>
-      <p:nvGrpSpPr>
-        <p:cNvPr id="1" name=""/>
-        <p:cNvGrpSpPr/>
-        <p:nvPr/>
-      </p:nvGrpSpPr>
-      <p:grpSpPr>
-        <a:xfrm>
-          <a:off x="0" y="0"/>
-          <a:ext cx="0" cy="0"/>
-          <a:chOff x="0" y="0"/>
-          <a:chExt cx="0" cy="0"/>
-        </a:xfrm>
-      </p:grpSpPr>
-      <p:sp>
-        <p:nvSpPr>
-          <p:cNvPr id="2" name="Vertical Title 1">
-            <a:extLst>
-              <a:ext uri="{FF2B5EF4-FFF2-40B4-BE49-F238E27FC236}">
-                <a16:creationId xmlns:a16="http://schemas.microsoft.com/office/drawing/2014/main" id="{AAA31BA9-F34F-9C42-B61A-75CE091BE33A}"/>
-              </a:ext>
-            </a:extLst>
-          </p:cNvPr>
-          <p:cNvSpPr>
-            <a:spLocks noGrp="1"/>
-          </p:cNvSpPr>
-          <p:nvPr>
-            <p:ph type="title" orient="vert"/>
-          </p:nvPr>
-        </p:nvSpPr>
-        <p:spPr>
-          <a:xfrm>
-            <a:off x="8724900" y="365125"/>
-            <a:ext cx="2628900" cy="5811838"/>
-          </a:xfrm>
-        </p:spPr>
-        <p:txBody>
-          <a:bodyPr vert="eaVert"/>
-          <a:lstStyle/>
-          <a:p>
-            <a:r>
-              <a:rPr lang="en-US"/>
-              <a:t>Click to edit Master title style</a:t>
-            </a:r>
-          </a:p>
-        </p:txBody>
-      </p:sp>
-      <p:sp>
-        <p:nvSpPr>
-          <p:cNvPr id="3" name="Vertical Text Placeholder 2">
-            <a:extLst>
-              <a:ext uri="{FF2B5EF4-FFF2-40B4-BE49-F238E27FC236}">
-                <a16:creationId xmlns:a16="http://schemas.microsoft.com/office/drawing/2014/main" id="{21507FD7-4C27-4547-B070-3DD9E1989609}"/>
-              </a:ext>
-            </a:extLst>
-          </p:cNvPr>
-          <p:cNvSpPr>
-            <a:spLocks noGrp="1"/>
-          </p:cNvSpPr>
-          <p:nvPr>
-            <p:ph type="body" orient="vert" idx="1"/>
-          </p:nvPr>
-        </p:nvSpPr>
-        <p:spPr>
-          <a:xfrm>
-            <a:off x="838200" y="365125"/>
-            <a:ext cx="7734300" cy="5811838"/>
-          </a:xfrm>
-        </p:spPr>
-        <p:txBody>
-          <a:bodyPr vert="eaVert"/>
-          <a:lstStyle/>
-          <a:p>
-            <a:pPr lvl="0"/>
-            <a:r>
-              <a:rPr lang="en-US"/>
-              <a:t>Click to edit Master text styles</a:t>
-            </a:r>
-          </a:p>
-          <a:p>
-            <a:pPr lvl="1"/>
-            <a:r>
-              <a:rPr lang="en-US"/>
-              <a:t>Second level</a:t>
-            </a:r>
-          </a:p>
-          <a:p>
-            <a:pPr lvl="2"/>
-            <a:r>
-              <a:rPr lang="en-US"/>
-              <a:t>Third level</a:t>
-            </a:r>
-          </a:p>
-          <a:p>
-            <a:pPr lvl="3"/>
-            <a:r>
-              <a:rPr lang="en-US"/>
-              <a:t>Fourth level</a:t>
-            </a:r>
-          </a:p>
-          <a:p>
-            <a:pPr lvl="4"/>
-            <a:r>
-              <a:rPr lang="en-US"/>
-              <a:t>Fifth level</a:t>
-            </a:r>
-          </a:p>
-        </p:txBody>
-      </p:sp>
-      <p:sp>
-        <p:nvSpPr>
-          <p:cNvPr id="4" name="Date Placeholder 3">
-            <a:extLst>
-              <a:ext uri="{FF2B5EF4-FFF2-40B4-BE49-F238E27FC236}">
-                <a16:creationId xmlns:a16="http://schemas.microsoft.com/office/drawing/2014/main" id="{45DD971F-3667-1A40-AF3B-2E00C3A75DF2}"/>
-              </a:ext>
-            </a:extLst>
-          </p:cNvPr>
-          <p:cNvSpPr>
-            <a:spLocks noGrp="1"/>
-          </p:cNvSpPr>
-          <p:nvPr>
-            <p:ph type="dt" sz="half" idx="10"/>
-          </p:nvPr>
-        </p:nvSpPr>
-        <p:spPr/>
-        <p:txBody>
-          <a:bodyPr/>
-          <a:lstStyle/>
-          <a:p>
-            <a:fld id="{241EB5C9-1307-BA42-ABA2-0BC069CD8E7F}" type="datetimeFigureOut">
-              <a:rPr lang="en-US" smtClean="0"/>
-              <a:t>4/7/21</a:t>
-            </a:fld>
-            <a:endParaRPr lang="en-US"/>
-          </a:p>
-        </p:txBody>
-      </p:sp>
-      <p:sp>
-        <p:nvSpPr>
-          <p:cNvPr id="5" name="Footer Placeholder 4">
-            <a:extLst>
-              <a:ext uri="{FF2B5EF4-FFF2-40B4-BE49-F238E27FC236}">
-                <a16:creationId xmlns:a16="http://schemas.microsoft.com/office/drawing/2014/main" id="{6A86F6E2-6996-0345-954C-CD64DB945184}"/>
-              </a:ext>
-            </a:extLst>
-          </p:cNvPr>
-          <p:cNvSpPr>
-            <a:spLocks noGrp="1"/>
-          </p:cNvSpPr>
-          <p:nvPr>
-            <p:ph type="ftr" sz="quarter" idx="11"/>
-          </p:nvPr>
-        </p:nvSpPr>
-        <p:spPr/>
-        <p:txBody>
-          <a:bodyPr/>
-          <a:lstStyle/>
-          <a:p>
-            <a:endParaRPr lang="en-US"/>
-          </a:p>
-        </p:txBody>
-      </p:sp>
-      <p:sp>
-        <p:nvSpPr>
-          <p:cNvPr id="6" name="Slide Number Placeholder 5">
-            <a:extLst>
-              <a:ext uri="{FF2B5EF4-FFF2-40B4-BE49-F238E27FC236}">
-                <a16:creationId xmlns:a16="http://schemas.microsoft.com/office/drawing/2014/main" id="{AEA4104F-3E79-6D43-B0B6-4B568C124089}"/>
-              </a:ext>
-            </a:extLst>
-          </p:cNvPr>
-          <p:cNvSpPr>
-            <a:spLocks noGrp="1"/>
-          </p:cNvSpPr>
-          <p:nvPr>
-            <p:ph type="sldNum" sz="quarter" idx="12"/>
-          </p:nvPr>
-        </p:nvSpPr>
-        <p:spPr/>
-        <p:txBody>
-          <a:bodyPr/>
-          <a:lstStyle/>
-          <a:p>
-            <a:fld id="{C5EF2332-01BF-834F-8236-50238282D533}" type="slidenum">
-              <a:rPr lang="en-US" smtClean="0"/>
-              <a:t>‹#›</a:t>
-            </a:fld>
-            <a:endParaRPr lang="en-US"/>
-          </a:p>
-        </p:txBody>
-      </p:sp>
-    </p:spTree>
-    <p:extLst>
-      <p:ext uri="{BB962C8B-B14F-4D97-AF65-F5344CB8AC3E}">
-        <p14:creationId xmlns:p14="http://schemas.microsoft.com/office/powerpoint/2010/main" val="3023597890"/>
-      </p:ext>
-    </p:extLst>
-  </p:cSld>
-  <p:clrMapOvr>
-    <a:masterClrMapping/>
-  </p:clrMapOvr>
-</p:sldLayout>
-</file>
-
 <file path=ppt/slideLayouts/slideLayout2.xml><?xml version="1.0" encoding="utf-8"?>
 <p:sldLayout xmlns:a="http://schemas.openxmlformats.org/drawingml/2006/main" xmlns:r="http://schemas.openxmlformats.org/officeDocument/2006/relationships" xmlns:p="http://schemas.openxmlformats.org/presentationml/2006/main" type="obj" preserve="1">
   <p:cSld name="Title and Content">
@@ -1923,1271 +1517,6 @@
 </p:sldLayout>
 </file>
 
-<file path=ppt/slideLayouts/slideLayout5.xml><?xml version="1.0" encoding="utf-8"?>
-<p:sldLayout xmlns:a="http://schemas.openxmlformats.org/drawingml/2006/main" xmlns:r="http://schemas.openxmlformats.org/officeDocument/2006/relationships" xmlns:p="http://schemas.openxmlformats.org/presentationml/2006/main" type="twoTxTwoObj" preserve="1">
-  <p:cSld name="Comparison">
-    <p:spTree>
-      <p:nvGrpSpPr>
-        <p:cNvPr id="1" name=""/>
-        <p:cNvGrpSpPr/>
-        <p:nvPr/>
-      </p:nvGrpSpPr>
-      <p:grpSpPr>
-        <a:xfrm>
-          <a:off x="0" y="0"/>
-          <a:ext cx="0" cy="0"/>
-          <a:chOff x="0" y="0"/>
-          <a:chExt cx="0" cy="0"/>
-        </a:xfrm>
-      </p:grpSpPr>
-      <p:sp>
-        <p:nvSpPr>
-          <p:cNvPr id="2" name="Title 1">
-            <a:extLst>
-              <a:ext uri="{FF2B5EF4-FFF2-40B4-BE49-F238E27FC236}">
-                <a16:creationId xmlns:a16="http://schemas.microsoft.com/office/drawing/2014/main" id="{B2920480-55EB-FC4B-9882-5FE594CA1000}"/>
-              </a:ext>
-            </a:extLst>
-          </p:cNvPr>
-          <p:cNvSpPr>
-            <a:spLocks noGrp="1"/>
-          </p:cNvSpPr>
-          <p:nvPr>
-            <p:ph type="title"/>
-          </p:nvPr>
-        </p:nvSpPr>
-        <p:spPr>
-          <a:xfrm>
-            <a:off x="839788" y="365125"/>
-            <a:ext cx="10515600" cy="1325563"/>
-          </a:xfrm>
-        </p:spPr>
-        <p:txBody>
-          <a:bodyPr/>
-          <a:lstStyle/>
-          <a:p>
-            <a:r>
-              <a:rPr lang="en-US"/>
-              <a:t>Click to edit Master title style</a:t>
-            </a:r>
-          </a:p>
-        </p:txBody>
-      </p:sp>
-      <p:sp>
-        <p:nvSpPr>
-          <p:cNvPr id="3" name="Text Placeholder 2">
-            <a:extLst>
-              <a:ext uri="{FF2B5EF4-FFF2-40B4-BE49-F238E27FC236}">
-                <a16:creationId xmlns:a16="http://schemas.microsoft.com/office/drawing/2014/main" id="{BD1C8D7D-7258-9748-9653-BADA2E1CEA57}"/>
-              </a:ext>
-            </a:extLst>
-          </p:cNvPr>
-          <p:cNvSpPr>
-            <a:spLocks noGrp="1"/>
-          </p:cNvSpPr>
-          <p:nvPr>
-            <p:ph type="body" idx="1"/>
-          </p:nvPr>
-        </p:nvSpPr>
-        <p:spPr>
-          <a:xfrm>
-            <a:off x="839788" y="1681163"/>
-            <a:ext cx="5157787" cy="823912"/>
-          </a:xfrm>
-        </p:spPr>
-        <p:txBody>
-          <a:bodyPr anchor="b"/>
-          <a:lstStyle>
-            <a:lvl1pPr marL="0" indent="0">
-              <a:buNone/>
-              <a:defRPr sz="2400" b="1"/>
-            </a:lvl1pPr>
-            <a:lvl2pPr marL="457200" indent="0">
-              <a:buNone/>
-              <a:defRPr sz="2000" b="1"/>
-            </a:lvl2pPr>
-            <a:lvl3pPr marL="914400" indent="0">
-              <a:buNone/>
-              <a:defRPr sz="1800" b="1"/>
-            </a:lvl3pPr>
-            <a:lvl4pPr marL="1371600" indent="0">
-              <a:buNone/>
-              <a:defRPr sz="1600" b="1"/>
-            </a:lvl4pPr>
-            <a:lvl5pPr marL="1828800" indent="0">
-              <a:buNone/>
-              <a:defRPr sz="1600" b="1"/>
-            </a:lvl5pPr>
-            <a:lvl6pPr marL="2286000" indent="0">
-              <a:buNone/>
-              <a:defRPr sz="1600" b="1"/>
-            </a:lvl6pPr>
-            <a:lvl7pPr marL="2743200" indent="0">
-              <a:buNone/>
-              <a:defRPr sz="1600" b="1"/>
-            </a:lvl7pPr>
-            <a:lvl8pPr marL="3200400" indent="0">
-              <a:buNone/>
-              <a:defRPr sz="1600" b="1"/>
-            </a:lvl8pPr>
-            <a:lvl9pPr marL="3657600" indent="0">
-              <a:buNone/>
-              <a:defRPr sz="1600" b="1"/>
-            </a:lvl9pPr>
-          </a:lstStyle>
-          <a:p>
-            <a:pPr lvl="0"/>
-            <a:r>
-              <a:rPr lang="en-US"/>
-              <a:t>Click to edit Master text styles</a:t>
-            </a:r>
-          </a:p>
-        </p:txBody>
-      </p:sp>
-      <p:sp>
-        <p:nvSpPr>
-          <p:cNvPr id="4" name="Content Placeholder 3">
-            <a:extLst>
-              <a:ext uri="{FF2B5EF4-FFF2-40B4-BE49-F238E27FC236}">
-                <a16:creationId xmlns:a16="http://schemas.microsoft.com/office/drawing/2014/main" id="{96732A74-667B-6044-96A4-3945B80248C2}"/>
-              </a:ext>
-            </a:extLst>
-          </p:cNvPr>
-          <p:cNvSpPr>
-            <a:spLocks noGrp="1"/>
-          </p:cNvSpPr>
-          <p:nvPr>
-            <p:ph sz="half" idx="2"/>
-          </p:nvPr>
-        </p:nvSpPr>
-        <p:spPr>
-          <a:xfrm>
-            <a:off x="839788" y="2505075"/>
-            <a:ext cx="5157787" cy="3684588"/>
-          </a:xfrm>
-        </p:spPr>
-        <p:txBody>
-          <a:bodyPr/>
-          <a:lstStyle/>
-          <a:p>
-            <a:pPr lvl="0"/>
-            <a:r>
-              <a:rPr lang="en-US"/>
-              <a:t>Click to edit Master text styles</a:t>
-            </a:r>
-          </a:p>
-          <a:p>
-            <a:pPr lvl="1"/>
-            <a:r>
-              <a:rPr lang="en-US"/>
-              <a:t>Second level</a:t>
-            </a:r>
-          </a:p>
-          <a:p>
-            <a:pPr lvl="2"/>
-            <a:r>
-              <a:rPr lang="en-US"/>
-              <a:t>Third level</a:t>
-            </a:r>
-          </a:p>
-          <a:p>
-            <a:pPr lvl="3"/>
-            <a:r>
-              <a:rPr lang="en-US"/>
-              <a:t>Fourth level</a:t>
-            </a:r>
-          </a:p>
-          <a:p>
-            <a:pPr lvl="4"/>
-            <a:r>
-              <a:rPr lang="en-US"/>
-              <a:t>Fifth level</a:t>
-            </a:r>
-          </a:p>
-        </p:txBody>
-      </p:sp>
-      <p:sp>
-        <p:nvSpPr>
-          <p:cNvPr id="5" name="Text Placeholder 4">
-            <a:extLst>
-              <a:ext uri="{FF2B5EF4-FFF2-40B4-BE49-F238E27FC236}">
-                <a16:creationId xmlns:a16="http://schemas.microsoft.com/office/drawing/2014/main" id="{4E309C7E-6BCC-704D-820E-3DB5A36FCE63}"/>
-              </a:ext>
-            </a:extLst>
-          </p:cNvPr>
-          <p:cNvSpPr>
-            <a:spLocks noGrp="1"/>
-          </p:cNvSpPr>
-          <p:nvPr>
-            <p:ph type="body" sz="quarter" idx="3"/>
-          </p:nvPr>
-        </p:nvSpPr>
-        <p:spPr>
-          <a:xfrm>
-            <a:off x="6172200" y="1681163"/>
-            <a:ext cx="5183188" cy="823912"/>
-          </a:xfrm>
-        </p:spPr>
-        <p:txBody>
-          <a:bodyPr anchor="b"/>
-          <a:lstStyle>
-            <a:lvl1pPr marL="0" indent="0">
-              <a:buNone/>
-              <a:defRPr sz="2400" b="1"/>
-            </a:lvl1pPr>
-            <a:lvl2pPr marL="457200" indent="0">
-              <a:buNone/>
-              <a:defRPr sz="2000" b="1"/>
-            </a:lvl2pPr>
-            <a:lvl3pPr marL="914400" indent="0">
-              <a:buNone/>
-              <a:defRPr sz="1800" b="1"/>
-            </a:lvl3pPr>
-            <a:lvl4pPr marL="1371600" indent="0">
-              <a:buNone/>
-              <a:defRPr sz="1600" b="1"/>
-            </a:lvl4pPr>
-            <a:lvl5pPr marL="1828800" indent="0">
-              <a:buNone/>
-              <a:defRPr sz="1600" b="1"/>
-            </a:lvl5pPr>
-            <a:lvl6pPr marL="2286000" indent="0">
-              <a:buNone/>
-              <a:defRPr sz="1600" b="1"/>
-            </a:lvl6pPr>
-            <a:lvl7pPr marL="2743200" indent="0">
-              <a:buNone/>
-              <a:defRPr sz="1600" b="1"/>
-            </a:lvl7pPr>
-            <a:lvl8pPr marL="3200400" indent="0">
-              <a:buNone/>
-              <a:defRPr sz="1600" b="1"/>
-            </a:lvl8pPr>
-            <a:lvl9pPr marL="3657600" indent="0">
-              <a:buNone/>
-              <a:defRPr sz="1600" b="1"/>
-            </a:lvl9pPr>
-          </a:lstStyle>
-          <a:p>
-            <a:pPr lvl="0"/>
-            <a:r>
-              <a:rPr lang="en-US"/>
-              <a:t>Click to edit Master text styles</a:t>
-            </a:r>
-          </a:p>
-        </p:txBody>
-      </p:sp>
-      <p:sp>
-        <p:nvSpPr>
-          <p:cNvPr id="6" name="Content Placeholder 5">
-            <a:extLst>
-              <a:ext uri="{FF2B5EF4-FFF2-40B4-BE49-F238E27FC236}">
-                <a16:creationId xmlns:a16="http://schemas.microsoft.com/office/drawing/2014/main" id="{1928F8CA-EDA2-C342-9B11-08E185C8C28C}"/>
-              </a:ext>
-            </a:extLst>
-          </p:cNvPr>
-          <p:cNvSpPr>
-            <a:spLocks noGrp="1"/>
-          </p:cNvSpPr>
-          <p:nvPr>
-            <p:ph sz="quarter" idx="4"/>
-          </p:nvPr>
-        </p:nvSpPr>
-        <p:spPr>
-          <a:xfrm>
-            <a:off x="6172200" y="2505075"/>
-            <a:ext cx="5183188" cy="3684588"/>
-          </a:xfrm>
-        </p:spPr>
-        <p:txBody>
-          <a:bodyPr/>
-          <a:lstStyle/>
-          <a:p>
-            <a:pPr lvl="0"/>
-            <a:r>
-              <a:rPr lang="en-US"/>
-              <a:t>Click to edit Master text styles</a:t>
-            </a:r>
-          </a:p>
-          <a:p>
-            <a:pPr lvl="1"/>
-            <a:r>
-              <a:rPr lang="en-US"/>
-              <a:t>Second level</a:t>
-            </a:r>
-          </a:p>
-          <a:p>
-            <a:pPr lvl="2"/>
-            <a:r>
-              <a:rPr lang="en-US"/>
-              <a:t>Third level</a:t>
-            </a:r>
-          </a:p>
-          <a:p>
-            <a:pPr lvl="3"/>
-            <a:r>
-              <a:rPr lang="en-US"/>
-              <a:t>Fourth level</a:t>
-            </a:r>
-          </a:p>
-          <a:p>
-            <a:pPr lvl="4"/>
-            <a:r>
-              <a:rPr lang="en-US"/>
-              <a:t>Fifth level</a:t>
-            </a:r>
-          </a:p>
-        </p:txBody>
-      </p:sp>
-      <p:sp>
-        <p:nvSpPr>
-          <p:cNvPr id="7" name="Date Placeholder 6">
-            <a:extLst>
-              <a:ext uri="{FF2B5EF4-FFF2-40B4-BE49-F238E27FC236}">
-                <a16:creationId xmlns:a16="http://schemas.microsoft.com/office/drawing/2014/main" id="{0B7BB602-F8C0-B544-8111-E180A99E9B1B}"/>
-              </a:ext>
-            </a:extLst>
-          </p:cNvPr>
-          <p:cNvSpPr>
-            <a:spLocks noGrp="1"/>
-          </p:cNvSpPr>
-          <p:nvPr>
-            <p:ph type="dt" sz="half" idx="10"/>
-          </p:nvPr>
-        </p:nvSpPr>
-        <p:spPr/>
-        <p:txBody>
-          <a:bodyPr/>
-          <a:lstStyle/>
-          <a:p>
-            <a:fld id="{241EB5C9-1307-BA42-ABA2-0BC069CD8E7F}" type="datetimeFigureOut">
-              <a:rPr lang="en-US" smtClean="0"/>
-              <a:t>4/7/21</a:t>
-            </a:fld>
-            <a:endParaRPr lang="en-US"/>
-          </a:p>
-        </p:txBody>
-      </p:sp>
-      <p:sp>
-        <p:nvSpPr>
-          <p:cNvPr id="8" name="Footer Placeholder 7">
-            <a:extLst>
-              <a:ext uri="{FF2B5EF4-FFF2-40B4-BE49-F238E27FC236}">
-                <a16:creationId xmlns:a16="http://schemas.microsoft.com/office/drawing/2014/main" id="{87E362E1-37F4-4242-A499-52BAB5E3088C}"/>
-              </a:ext>
-            </a:extLst>
-          </p:cNvPr>
-          <p:cNvSpPr>
-            <a:spLocks noGrp="1"/>
-          </p:cNvSpPr>
-          <p:nvPr>
-            <p:ph type="ftr" sz="quarter" idx="11"/>
-          </p:nvPr>
-        </p:nvSpPr>
-        <p:spPr/>
-        <p:txBody>
-          <a:bodyPr/>
-          <a:lstStyle/>
-          <a:p>
-            <a:endParaRPr lang="en-US"/>
-          </a:p>
-        </p:txBody>
-      </p:sp>
-      <p:sp>
-        <p:nvSpPr>
-          <p:cNvPr id="9" name="Slide Number Placeholder 8">
-            <a:extLst>
-              <a:ext uri="{FF2B5EF4-FFF2-40B4-BE49-F238E27FC236}">
-                <a16:creationId xmlns:a16="http://schemas.microsoft.com/office/drawing/2014/main" id="{82F173F2-515D-8B40-9C81-6B8492B1E793}"/>
-              </a:ext>
-            </a:extLst>
-          </p:cNvPr>
-          <p:cNvSpPr>
-            <a:spLocks noGrp="1"/>
-          </p:cNvSpPr>
-          <p:nvPr>
-            <p:ph type="sldNum" sz="quarter" idx="12"/>
-          </p:nvPr>
-        </p:nvSpPr>
-        <p:spPr/>
-        <p:txBody>
-          <a:bodyPr/>
-          <a:lstStyle/>
-          <a:p>
-            <a:fld id="{C5EF2332-01BF-834F-8236-50238282D533}" type="slidenum">
-              <a:rPr lang="en-US" smtClean="0"/>
-              <a:t>‹#›</a:t>
-            </a:fld>
-            <a:endParaRPr lang="en-US"/>
-          </a:p>
-        </p:txBody>
-      </p:sp>
-    </p:spTree>
-    <p:extLst>
-      <p:ext uri="{BB962C8B-B14F-4D97-AF65-F5344CB8AC3E}">
-        <p14:creationId xmlns:p14="http://schemas.microsoft.com/office/powerpoint/2010/main" val="348772296"/>
-      </p:ext>
-    </p:extLst>
-  </p:cSld>
-  <p:clrMapOvr>
-    <a:masterClrMapping/>
-  </p:clrMapOvr>
-</p:sldLayout>
-</file>
-
-<file path=ppt/slideLayouts/slideLayout6.xml><?xml version="1.0" encoding="utf-8"?>
-<p:sldLayout xmlns:a="http://schemas.openxmlformats.org/drawingml/2006/main" xmlns:r="http://schemas.openxmlformats.org/officeDocument/2006/relationships" xmlns:p="http://schemas.openxmlformats.org/presentationml/2006/main" type="titleOnly" preserve="1">
-  <p:cSld name="Title Only">
-    <p:spTree>
-      <p:nvGrpSpPr>
-        <p:cNvPr id="1" name=""/>
-        <p:cNvGrpSpPr/>
-        <p:nvPr/>
-      </p:nvGrpSpPr>
-      <p:grpSpPr>
-        <a:xfrm>
-          <a:off x="0" y="0"/>
-          <a:ext cx="0" cy="0"/>
-          <a:chOff x="0" y="0"/>
-          <a:chExt cx="0" cy="0"/>
-        </a:xfrm>
-      </p:grpSpPr>
-      <p:sp>
-        <p:nvSpPr>
-          <p:cNvPr id="2" name="Title 1">
-            <a:extLst>
-              <a:ext uri="{FF2B5EF4-FFF2-40B4-BE49-F238E27FC236}">
-                <a16:creationId xmlns:a16="http://schemas.microsoft.com/office/drawing/2014/main" id="{B69C8B98-D82F-0B48-A8EF-F2FDC6BAFA00}"/>
-              </a:ext>
-            </a:extLst>
-          </p:cNvPr>
-          <p:cNvSpPr>
-            <a:spLocks noGrp="1"/>
-          </p:cNvSpPr>
-          <p:nvPr>
-            <p:ph type="title"/>
-          </p:nvPr>
-        </p:nvSpPr>
-        <p:spPr/>
-        <p:txBody>
-          <a:bodyPr/>
-          <a:lstStyle/>
-          <a:p>
-            <a:r>
-              <a:rPr lang="en-US"/>
-              <a:t>Click to edit Master title style</a:t>
-            </a:r>
-          </a:p>
-        </p:txBody>
-      </p:sp>
-      <p:sp>
-        <p:nvSpPr>
-          <p:cNvPr id="3" name="Date Placeholder 2">
-            <a:extLst>
-              <a:ext uri="{FF2B5EF4-FFF2-40B4-BE49-F238E27FC236}">
-                <a16:creationId xmlns:a16="http://schemas.microsoft.com/office/drawing/2014/main" id="{A981C2FF-3BDB-D746-A0A1-3189D770A349}"/>
-              </a:ext>
-            </a:extLst>
-          </p:cNvPr>
-          <p:cNvSpPr>
-            <a:spLocks noGrp="1"/>
-          </p:cNvSpPr>
-          <p:nvPr>
-            <p:ph type="dt" sz="half" idx="10"/>
-          </p:nvPr>
-        </p:nvSpPr>
-        <p:spPr/>
-        <p:txBody>
-          <a:bodyPr/>
-          <a:lstStyle/>
-          <a:p>
-            <a:fld id="{241EB5C9-1307-BA42-ABA2-0BC069CD8E7F}" type="datetimeFigureOut">
-              <a:rPr lang="en-US" smtClean="0"/>
-              <a:t>4/7/21</a:t>
-            </a:fld>
-            <a:endParaRPr lang="en-US"/>
-          </a:p>
-        </p:txBody>
-      </p:sp>
-      <p:sp>
-        <p:nvSpPr>
-          <p:cNvPr id="4" name="Footer Placeholder 3">
-            <a:extLst>
-              <a:ext uri="{FF2B5EF4-FFF2-40B4-BE49-F238E27FC236}">
-                <a16:creationId xmlns:a16="http://schemas.microsoft.com/office/drawing/2014/main" id="{AB29B26A-13F0-8B4A-9B23-B1DEB398CB7B}"/>
-              </a:ext>
-            </a:extLst>
-          </p:cNvPr>
-          <p:cNvSpPr>
-            <a:spLocks noGrp="1"/>
-          </p:cNvSpPr>
-          <p:nvPr>
-            <p:ph type="ftr" sz="quarter" idx="11"/>
-          </p:nvPr>
-        </p:nvSpPr>
-        <p:spPr/>
-        <p:txBody>
-          <a:bodyPr/>
-          <a:lstStyle/>
-          <a:p>
-            <a:endParaRPr lang="en-US"/>
-          </a:p>
-        </p:txBody>
-      </p:sp>
-      <p:sp>
-        <p:nvSpPr>
-          <p:cNvPr id="5" name="Slide Number Placeholder 4">
-            <a:extLst>
-              <a:ext uri="{FF2B5EF4-FFF2-40B4-BE49-F238E27FC236}">
-                <a16:creationId xmlns:a16="http://schemas.microsoft.com/office/drawing/2014/main" id="{1445D5A9-BCA5-C247-9447-28900ED90ACC}"/>
-              </a:ext>
-            </a:extLst>
-          </p:cNvPr>
-          <p:cNvSpPr>
-            <a:spLocks noGrp="1"/>
-          </p:cNvSpPr>
-          <p:nvPr>
-            <p:ph type="sldNum" sz="quarter" idx="12"/>
-          </p:nvPr>
-        </p:nvSpPr>
-        <p:spPr/>
-        <p:txBody>
-          <a:bodyPr/>
-          <a:lstStyle/>
-          <a:p>
-            <a:fld id="{C5EF2332-01BF-834F-8236-50238282D533}" type="slidenum">
-              <a:rPr lang="en-US" smtClean="0"/>
-              <a:t>‹#›</a:t>
-            </a:fld>
-            <a:endParaRPr lang="en-US"/>
-          </a:p>
-        </p:txBody>
-      </p:sp>
-    </p:spTree>
-    <p:extLst>
-      <p:ext uri="{BB962C8B-B14F-4D97-AF65-F5344CB8AC3E}">
-        <p14:creationId xmlns:p14="http://schemas.microsoft.com/office/powerpoint/2010/main" val="2186556468"/>
-      </p:ext>
-    </p:extLst>
-  </p:cSld>
-  <p:clrMapOvr>
-    <a:masterClrMapping/>
-  </p:clrMapOvr>
-</p:sldLayout>
-</file>
-
-<file path=ppt/slideLayouts/slideLayout7.xml><?xml version="1.0" encoding="utf-8"?>
-<p:sldLayout xmlns:a="http://schemas.openxmlformats.org/drawingml/2006/main" xmlns:r="http://schemas.openxmlformats.org/officeDocument/2006/relationships" xmlns:p="http://schemas.openxmlformats.org/presentationml/2006/main" type="blank" preserve="1">
-  <p:cSld name="Blank">
-    <p:spTree>
-      <p:nvGrpSpPr>
-        <p:cNvPr id="1" name=""/>
-        <p:cNvGrpSpPr/>
-        <p:nvPr/>
-      </p:nvGrpSpPr>
-      <p:grpSpPr>
-        <a:xfrm>
-          <a:off x="0" y="0"/>
-          <a:ext cx="0" cy="0"/>
-          <a:chOff x="0" y="0"/>
-          <a:chExt cx="0" cy="0"/>
-        </a:xfrm>
-      </p:grpSpPr>
-      <p:sp>
-        <p:nvSpPr>
-          <p:cNvPr id="2" name="Date Placeholder 1">
-            <a:extLst>
-              <a:ext uri="{FF2B5EF4-FFF2-40B4-BE49-F238E27FC236}">
-                <a16:creationId xmlns:a16="http://schemas.microsoft.com/office/drawing/2014/main" id="{1FEEFF56-BEC7-7148-B8BA-48609561ADB6}"/>
-              </a:ext>
-            </a:extLst>
-          </p:cNvPr>
-          <p:cNvSpPr>
-            <a:spLocks noGrp="1"/>
-          </p:cNvSpPr>
-          <p:nvPr>
-            <p:ph type="dt" sz="half" idx="10"/>
-          </p:nvPr>
-        </p:nvSpPr>
-        <p:spPr/>
-        <p:txBody>
-          <a:bodyPr/>
-          <a:lstStyle/>
-          <a:p>
-            <a:fld id="{241EB5C9-1307-BA42-ABA2-0BC069CD8E7F}" type="datetimeFigureOut">
-              <a:rPr lang="en-US" smtClean="0"/>
-              <a:t>4/7/21</a:t>
-            </a:fld>
-            <a:endParaRPr lang="en-US"/>
-          </a:p>
-        </p:txBody>
-      </p:sp>
-      <p:sp>
-        <p:nvSpPr>
-          <p:cNvPr id="3" name="Footer Placeholder 2">
-            <a:extLst>
-              <a:ext uri="{FF2B5EF4-FFF2-40B4-BE49-F238E27FC236}">
-                <a16:creationId xmlns:a16="http://schemas.microsoft.com/office/drawing/2014/main" id="{E892B02A-E459-6E40-AFF7-1C8A4BCE9FE7}"/>
-              </a:ext>
-            </a:extLst>
-          </p:cNvPr>
-          <p:cNvSpPr>
-            <a:spLocks noGrp="1"/>
-          </p:cNvSpPr>
-          <p:nvPr>
-            <p:ph type="ftr" sz="quarter" idx="11"/>
-          </p:nvPr>
-        </p:nvSpPr>
-        <p:spPr/>
-        <p:txBody>
-          <a:bodyPr/>
-          <a:lstStyle/>
-          <a:p>
-            <a:endParaRPr lang="en-US"/>
-          </a:p>
-        </p:txBody>
-      </p:sp>
-      <p:sp>
-        <p:nvSpPr>
-          <p:cNvPr id="4" name="Slide Number Placeholder 3">
-            <a:extLst>
-              <a:ext uri="{FF2B5EF4-FFF2-40B4-BE49-F238E27FC236}">
-                <a16:creationId xmlns:a16="http://schemas.microsoft.com/office/drawing/2014/main" id="{A54EF6DA-5BA7-714D-939E-DF1972FE0AB5}"/>
-              </a:ext>
-            </a:extLst>
-          </p:cNvPr>
-          <p:cNvSpPr>
-            <a:spLocks noGrp="1"/>
-          </p:cNvSpPr>
-          <p:nvPr>
-            <p:ph type="sldNum" sz="quarter" idx="12"/>
-          </p:nvPr>
-        </p:nvSpPr>
-        <p:spPr/>
-        <p:txBody>
-          <a:bodyPr/>
-          <a:lstStyle/>
-          <a:p>
-            <a:fld id="{C5EF2332-01BF-834F-8236-50238282D533}" type="slidenum">
-              <a:rPr lang="en-US" smtClean="0"/>
-              <a:t>‹#›</a:t>
-            </a:fld>
-            <a:endParaRPr lang="en-US"/>
-          </a:p>
-        </p:txBody>
-      </p:sp>
-    </p:spTree>
-    <p:extLst>
-      <p:ext uri="{BB962C8B-B14F-4D97-AF65-F5344CB8AC3E}">
-        <p14:creationId xmlns:p14="http://schemas.microsoft.com/office/powerpoint/2010/main" val="2242355094"/>
-      </p:ext>
-    </p:extLst>
-  </p:cSld>
-  <p:clrMapOvr>
-    <a:masterClrMapping/>
-  </p:clrMapOvr>
-</p:sldLayout>
-</file>
-
-<file path=ppt/slideLayouts/slideLayout8.xml><?xml version="1.0" encoding="utf-8"?>
-<p:sldLayout xmlns:a="http://schemas.openxmlformats.org/drawingml/2006/main" xmlns:r="http://schemas.openxmlformats.org/officeDocument/2006/relationships" xmlns:p="http://schemas.openxmlformats.org/presentationml/2006/main" type="objTx" preserve="1">
-  <p:cSld name="Content with Caption">
-    <p:spTree>
-      <p:nvGrpSpPr>
-        <p:cNvPr id="1" name=""/>
-        <p:cNvGrpSpPr/>
-        <p:nvPr/>
-      </p:nvGrpSpPr>
-      <p:grpSpPr>
-        <a:xfrm>
-          <a:off x="0" y="0"/>
-          <a:ext cx="0" cy="0"/>
-          <a:chOff x="0" y="0"/>
-          <a:chExt cx="0" cy="0"/>
-        </a:xfrm>
-      </p:grpSpPr>
-      <p:sp>
-        <p:nvSpPr>
-          <p:cNvPr id="2" name="Title 1">
-            <a:extLst>
-              <a:ext uri="{FF2B5EF4-FFF2-40B4-BE49-F238E27FC236}">
-                <a16:creationId xmlns:a16="http://schemas.microsoft.com/office/drawing/2014/main" id="{9B025A5D-39AD-B841-8968-BCB9E84E872D}"/>
-              </a:ext>
-            </a:extLst>
-          </p:cNvPr>
-          <p:cNvSpPr>
-            <a:spLocks noGrp="1"/>
-          </p:cNvSpPr>
-          <p:nvPr>
-            <p:ph type="title"/>
-          </p:nvPr>
-        </p:nvSpPr>
-        <p:spPr>
-          <a:xfrm>
-            <a:off x="839788" y="457200"/>
-            <a:ext cx="3932237" cy="1600200"/>
-          </a:xfrm>
-        </p:spPr>
-        <p:txBody>
-          <a:bodyPr anchor="b"/>
-          <a:lstStyle>
-            <a:lvl1pPr>
-              <a:defRPr sz="3200"/>
-            </a:lvl1pPr>
-          </a:lstStyle>
-          <a:p>
-            <a:r>
-              <a:rPr lang="en-US"/>
-              <a:t>Click to edit Master title style</a:t>
-            </a:r>
-          </a:p>
-        </p:txBody>
-      </p:sp>
-      <p:sp>
-        <p:nvSpPr>
-          <p:cNvPr id="3" name="Content Placeholder 2">
-            <a:extLst>
-              <a:ext uri="{FF2B5EF4-FFF2-40B4-BE49-F238E27FC236}">
-                <a16:creationId xmlns:a16="http://schemas.microsoft.com/office/drawing/2014/main" id="{323D8FD2-642F-504B-AA46-4C4A370B95F0}"/>
-              </a:ext>
-            </a:extLst>
-          </p:cNvPr>
-          <p:cNvSpPr>
-            <a:spLocks noGrp="1"/>
-          </p:cNvSpPr>
-          <p:nvPr>
-            <p:ph idx="1"/>
-          </p:nvPr>
-        </p:nvSpPr>
-        <p:spPr>
-          <a:xfrm>
-            <a:off x="5183188" y="987425"/>
-            <a:ext cx="6172200" cy="4873625"/>
-          </a:xfrm>
-        </p:spPr>
-        <p:txBody>
-          <a:bodyPr/>
-          <a:lstStyle>
-            <a:lvl1pPr>
-              <a:defRPr sz="3200"/>
-            </a:lvl1pPr>
-            <a:lvl2pPr>
-              <a:defRPr sz="2800"/>
-            </a:lvl2pPr>
-            <a:lvl3pPr>
-              <a:defRPr sz="2400"/>
-            </a:lvl3pPr>
-            <a:lvl4pPr>
-              <a:defRPr sz="2000"/>
-            </a:lvl4pPr>
-            <a:lvl5pPr>
-              <a:defRPr sz="2000"/>
-            </a:lvl5pPr>
-            <a:lvl6pPr>
-              <a:defRPr sz="2000"/>
-            </a:lvl6pPr>
-            <a:lvl7pPr>
-              <a:defRPr sz="2000"/>
-            </a:lvl7pPr>
-            <a:lvl8pPr>
-              <a:defRPr sz="2000"/>
-            </a:lvl8pPr>
-            <a:lvl9pPr>
-              <a:defRPr sz="2000"/>
-            </a:lvl9pPr>
-          </a:lstStyle>
-          <a:p>
-            <a:pPr lvl="0"/>
-            <a:r>
-              <a:rPr lang="en-US"/>
-              <a:t>Click to edit Master text styles</a:t>
-            </a:r>
-          </a:p>
-          <a:p>
-            <a:pPr lvl="1"/>
-            <a:r>
-              <a:rPr lang="en-US"/>
-              <a:t>Second level</a:t>
-            </a:r>
-          </a:p>
-          <a:p>
-            <a:pPr lvl="2"/>
-            <a:r>
-              <a:rPr lang="en-US"/>
-              <a:t>Third level</a:t>
-            </a:r>
-          </a:p>
-          <a:p>
-            <a:pPr lvl="3"/>
-            <a:r>
-              <a:rPr lang="en-US"/>
-              <a:t>Fourth level</a:t>
-            </a:r>
-          </a:p>
-          <a:p>
-            <a:pPr lvl="4"/>
-            <a:r>
-              <a:rPr lang="en-US"/>
-              <a:t>Fifth level</a:t>
-            </a:r>
-          </a:p>
-        </p:txBody>
-      </p:sp>
-      <p:sp>
-        <p:nvSpPr>
-          <p:cNvPr id="4" name="Text Placeholder 3">
-            <a:extLst>
-              <a:ext uri="{FF2B5EF4-FFF2-40B4-BE49-F238E27FC236}">
-                <a16:creationId xmlns:a16="http://schemas.microsoft.com/office/drawing/2014/main" id="{DF7231C4-00F2-504D-A0EC-D9706D0B50ED}"/>
-              </a:ext>
-            </a:extLst>
-          </p:cNvPr>
-          <p:cNvSpPr>
-            <a:spLocks noGrp="1"/>
-          </p:cNvSpPr>
-          <p:nvPr>
-            <p:ph type="body" sz="half" idx="2"/>
-          </p:nvPr>
-        </p:nvSpPr>
-        <p:spPr>
-          <a:xfrm>
-            <a:off x="839788" y="2057400"/>
-            <a:ext cx="3932237" cy="3811588"/>
-          </a:xfrm>
-        </p:spPr>
-        <p:txBody>
-          <a:bodyPr/>
-          <a:lstStyle>
-            <a:lvl1pPr marL="0" indent="0">
-              <a:buNone/>
-              <a:defRPr sz="1600"/>
-            </a:lvl1pPr>
-            <a:lvl2pPr marL="457200" indent="0">
-              <a:buNone/>
-              <a:defRPr sz="1400"/>
-            </a:lvl2pPr>
-            <a:lvl3pPr marL="914400" indent="0">
-              <a:buNone/>
-              <a:defRPr sz="1200"/>
-            </a:lvl3pPr>
-            <a:lvl4pPr marL="1371600" indent="0">
-              <a:buNone/>
-              <a:defRPr sz="1000"/>
-            </a:lvl4pPr>
-            <a:lvl5pPr marL="1828800" indent="0">
-              <a:buNone/>
-              <a:defRPr sz="1000"/>
-            </a:lvl5pPr>
-            <a:lvl6pPr marL="2286000" indent="0">
-              <a:buNone/>
-              <a:defRPr sz="1000"/>
-            </a:lvl6pPr>
-            <a:lvl7pPr marL="2743200" indent="0">
-              <a:buNone/>
-              <a:defRPr sz="1000"/>
-            </a:lvl7pPr>
-            <a:lvl8pPr marL="3200400" indent="0">
-              <a:buNone/>
-              <a:defRPr sz="1000"/>
-            </a:lvl8pPr>
-            <a:lvl9pPr marL="3657600" indent="0">
-              <a:buNone/>
-              <a:defRPr sz="1000"/>
-            </a:lvl9pPr>
-          </a:lstStyle>
-          <a:p>
-            <a:pPr lvl="0"/>
-            <a:r>
-              <a:rPr lang="en-US"/>
-              <a:t>Click to edit Master text styles</a:t>
-            </a:r>
-          </a:p>
-        </p:txBody>
-      </p:sp>
-      <p:sp>
-        <p:nvSpPr>
-          <p:cNvPr id="5" name="Date Placeholder 4">
-            <a:extLst>
-              <a:ext uri="{FF2B5EF4-FFF2-40B4-BE49-F238E27FC236}">
-                <a16:creationId xmlns:a16="http://schemas.microsoft.com/office/drawing/2014/main" id="{EC249057-26A1-1747-A1C2-EBBB68A9DE67}"/>
-              </a:ext>
-            </a:extLst>
-          </p:cNvPr>
-          <p:cNvSpPr>
-            <a:spLocks noGrp="1"/>
-          </p:cNvSpPr>
-          <p:nvPr>
-            <p:ph type="dt" sz="half" idx="10"/>
-          </p:nvPr>
-        </p:nvSpPr>
-        <p:spPr/>
-        <p:txBody>
-          <a:bodyPr/>
-          <a:lstStyle/>
-          <a:p>
-            <a:fld id="{241EB5C9-1307-BA42-ABA2-0BC069CD8E7F}" type="datetimeFigureOut">
-              <a:rPr lang="en-US" smtClean="0"/>
-              <a:t>4/7/21</a:t>
-            </a:fld>
-            <a:endParaRPr lang="en-US"/>
-          </a:p>
-        </p:txBody>
-      </p:sp>
-      <p:sp>
-        <p:nvSpPr>
-          <p:cNvPr id="6" name="Footer Placeholder 5">
-            <a:extLst>
-              <a:ext uri="{FF2B5EF4-FFF2-40B4-BE49-F238E27FC236}">
-                <a16:creationId xmlns:a16="http://schemas.microsoft.com/office/drawing/2014/main" id="{39028F71-BCBB-534C-883A-A0DCD7657C26}"/>
-              </a:ext>
-            </a:extLst>
-          </p:cNvPr>
-          <p:cNvSpPr>
-            <a:spLocks noGrp="1"/>
-          </p:cNvSpPr>
-          <p:nvPr>
-            <p:ph type="ftr" sz="quarter" idx="11"/>
-          </p:nvPr>
-        </p:nvSpPr>
-        <p:spPr/>
-        <p:txBody>
-          <a:bodyPr/>
-          <a:lstStyle/>
-          <a:p>
-            <a:endParaRPr lang="en-US"/>
-          </a:p>
-        </p:txBody>
-      </p:sp>
-      <p:sp>
-        <p:nvSpPr>
-          <p:cNvPr id="7" name="Slide Number Placeholder 6">
-            <a:extLst>
-              <a:ext uri="{FF2B5EF4-FFF2-40B4-BE49-F238E27FC236}">
-                <a16:creationId xmlns:a16="http://schemas.microsoft.com/office/drawing/2014/main" id="{94F425FF-ED75-6A42-B466-535BE612AD40}"/>
-              </a:ext>
-            </a:extLst>
-          </p:cNvPr>
-          <p:cNvSpPr>
-            <a:spLocks noGrp="1"/>
-          </p:cNvSpPr>
-          <p:nvPr>
-            <p:ph type="sldNum" sz="quarter" idx="12"/>
-          </p:nvPr>
-        </p:nvSpPr>
-        <p:spPr/>
-        <p:txBody>
-          <a:bodyPr/>
-          <a:lstStyle/>
-          <a:p>
-            <a:fld id="{C5EF2332-01BF-834F-8236-50238282D533}" type="slidenum">
-              <a:rPr lang="en-US" smtClean="0"/>
-              <a:t>‹#›</a:t>
-            </a:fld>
-            <a:endParaRPr lang="en-US"/>
-          </a:p>
-        </p:txBody>
-      </p:sp>
-    </p:spTree>
-    <p:extLst>
-      <p:ext uri="{BB962C8B-B14F-4D97-AF65-F5344CB8AC3E}">
-        <p14:creationId xmlns:p14="http://schemas.microsoft.com/office/powerpoint/2010/main" val="2955518514"/>
-      </p:ext>
-    </p:extLst>
-  </p:cSld>
-  <p:clrMapOvr>
-    <a:masterClrMapping/>
-  </p:clrMapOvr>
-</p:sldLayout>
-</file>
-
-<file path=ppt/slideLayouts/slideLayout9.xml><?xml version="1.0" encoding="utf-8"?>
-<p:sldLayout xmlns:a="http://schemas.openxmlformats.org/drawingml/2006/main" xmlns:r="http://schemas.openxmlformats.org/officeDocument/2006/relationships" xmlns:p="http://schemas.openxmlformats.org/presentationml/2006/main" type="picTx" preserve="1">
-  <p:cSld name="Picture with Caption">
-    <p:spTree>
-      <p:nvGrpSpPr>
-        <p:cNvPr id="1" name=""/>
-        <p:cNvGrpSpPr/>
-        <p:nvPr/>
-      </p:nvGrpSpPr>
-      <p:grpSpPr>
-        <a:xfrm>
-          <a:off x="0" y="0"/>
-          <a:ext cx="0" cy="0"/>
-          <a:chOff x="0" y="0"/>
-          <a:chExt cx="0" cy="0"/>
-        </a:xfrm>
-      </p:grpSpPr>
-      <p:sp>
-        <p:nvSpPr>
-          <p:cNvPr id="2" name="Title 1">
-            <a:extLst>
-              <a:ext uri="{FF2B5EF4-FFF2-40B4-BE49-F238E27FC236}">
-                <a16:creationId xmlns:a16="http://schemas.microsoft.com/office/drawing/2014/main" id="{AD564E7A-69D4-824D-A79A-EDB9B08FB2FF}"/>
-              </a:ext>
-            </a:extLst>
-          </p:cNvPr>
-          <p:cNvSpPr>
-            <a:spLocks noGrp="1"/>
-          </p:cNvSpPr>
-          <p:nvPr>
-            <p:ph type="title"/>
-          </p:nvPr>
-        </p:nvSpPr>
-        <p:spPr>
-          <a:xfrm>
-            <a:off x="839788" y="457200"/>
-            <a:ext cx="3932237" cy="1600200"/>
-          </a:xfrm>
-        </p:spPr>
-        <p:txBody>
-          <a:bodyPr anchor="b"/>
-          <a:lstStyle>
-            <a:lvl1pPr>
-              <a:defRPr sz="3200"/>
-            </a:lvl1pPr>
-          </a:lstStyle>
-          <a:p>
-            <a:r>
-              <a:rPr lang="en-US"/>
-              <a:t>Click to edit Master title style</a:t>
-            </a:r>
-          </a:p>
-        </p:txBody>
-      </p:sp>
-      <p:sp>
-        <p:nvSpPr>
-          <p:cNvPr id="3" name="Picture Placeholder 2">
-            <a:extLst>
-              <a:ext uri="{FF2B5EF4-FFF2-40B4-BE49-F238E27FC236}">
-                <a16:creationId xmlns:a16="http://schemas.microsoft.com/office/drawing/2014/main" id="{5A00D59B-C603-1343-8600-53D3A4616858}"/>
-              </a:ext>
-            </a:extLst>
-          </p:cNvPr>
-          <p:cNvSpPr>
-            <a:spLocks noGrp="1"/>
-          </p:cNvSpPr>
-          <p:nvPr>
-            <p:ph type="pic" idx="1"/>
-          </p:nvPr>
-        </p:nvSpPr>
-        <p:spPr>
-          <a:xfrm>
-            <a:off x="5183188" y="987425"/>
-            <a:ext cx="6172200" cy="4873625"/>
-          </a:xfrm>
-        </p:spPr>
-        <p:txBody>
-          <a:bodyPr/>
-          <a:lstStyle>
-            <a:lvl1pPr marL="0" indent="0">
-              <a:buNone/>
-              <a:defRPr sz="3200"/>
-            </a:lvl1pPr>
-            <a:lvl2pPr marL="457200" indent="0">
-              <a:buNone/>
-              <a:defRPr sz="2800"/>
-            </a:lvl2pPr>
-            <a:lvl3pPr marL="914400" indent="0">
-              <a:buNone/>
-              <a:defRPr sz="2400"/>
-            </a:lvl3pPr>
-            <a:lvl4pPr marL="1371600" indent="0">
-              <a:buNone/>
-              <a:defRPr sz="2000"/>
-            </a:lvl4pPr>
-            <a:lvl5pPr marL="1828800" indent="0">
-              <a:buNone/>
-              <a:defRPr sz="2000"/>
-            </a:lvl5pPr>
-            <a:lvl6pPr marL="2286000" indent="0">
-              <a:buNone/>
-              <a:defRPr sz="2000"/>
-            </a:lvl6pPr>
-            <a:lvl7pPr marL="2743200" indent="0">
-              <a:buNone/>
-              <a:defRPr sz="2000"/>
-            </a:lvl7pPr>
-            <a:lvl8pPr marL="3200400" indent="0">
-              <a:buNone/>
-              <a:defRPr sz="2000"/>
-            </a:lvl8pPr>
-            <a:lvl9pPr marL="3657600" indent="0">
-              <a:buNone/>
-              <a:defRPr sz="2000"/>
-            </a:lvl9pPr>
-          </a:lstStyle>
-          <a:p>
-            <a:endParaRPr lang="en-US"/>
-          </a:p>
-        </p:txBody>
-      </p:sp>
-      <p:sp>
-        <p:nvSpPr>
-          <p:cNvPr id="4" name="Text Placeholder 3">
-            <a:extLst>
-              <a:ext uri="{FF2B5EF4-FFF2-40B4-BE49-F238E27FC236}">
-                <a16:creationId xmlns:a16="http://schemas.microsoft.com/office/drawing/2014/main" id="{6C4F2A5A-9B14-6742-8178-B0AED0369658}"/>
-              </a:ext>
-            </a:extLst>
-          </p:cNvPr>
-          <p:cNvSpPr>
-            <a:spLocks noGrp="1"/>
-          </p:cNvSpPr>
-          <p:nvPr>
-            <p:ph type="body" sz="half" idx="2"/>
-          </p:nvPr>
-        </p:nvSpPr>
-        <p:spPr>
-          <a:xfrm>
-            <a:off x="839788" y="2057400"/>
-            <a:ext cx="3932237" cy="3811588"/>
-          </a:xfrm>
-        </p:spPr>
-        <p:txBody>
-          <a:bodyPr/>
-          <a:lstStyle>
-            <a:lvl1pPr marL="0" indent="0">
-              <a:buNone/>
-              <a:defRPr sz="1600"/>
-            </a:lvl1pPr>
-            <a:lvl2pPr marL="457200" indent="0">
-              <a:buNone/>
-              <a:defRPr sz="1400"/>
-            </a:lvl2pPr>
-            <a:lvl3pPr marL="914400" indent="0">
-              <a:buNone/>
-              <a:defRPr sz="1200"/>
-            </a:lvl3pPr>
-            <a:lvl4pPr marL="1371600" indent="0">
-              <a:buNone/>
-              <a:defRPr sz="1000"/>
-            </a:lvl4pPr>
-            <a:lvl5pPr marL="1828800" indent="0">
-              <a:buNone/>
-              <a:defRPr sz="1000"/>
-            </a:lvl5pPr>
-            <a:lvl6pPr marL="2286000" indent="0">
-              <a:buNone/>
-              <a:defRPr sz="1000"/>
-            </a:lvl6pPr>
-            <a:lvl7pPr marL="2743200" indent="0">
-              <a:buNone/>
-              <a:defRPr sz="1000"/>
-            </a:lvl7pPr>
-            <a:lvl8pPr marL="3200400" indent="0">
-              <a:buNone/>
-              <a:defRPr sz="1000"/>
-            </a:lvl8pPr>
-            <a:lvl9pPr marL="3657600" indent="0">
-              <a:buNone/>
-              <a:defRPr sz="1000"/>
-            </a:lvl9pPr>
-          </a:lstStyle>
-          <a:p>
-            <a:pPr lvl="0"/>
-            <a:r>
-              <a:rPr lang="en-US"/>
-              <a:t>Click to edit Master text styles</a:t>
-            </a:r>
-          </a:p>
-        </p:txBody>
-      </p:sp>
-      <p:sp>
-        <p:nvSpPr>
-          <p:cNvPr id="5" name="Date Placeholder 4">
-            <a:extLst>
-              <a:ext uri="{FF2B5EF4-FFF2-40B4-BE49-F238E27FC236}">
-                <a16:creationId xmlns:a16="http://schemas.microsoft.com/office/drawing/2014/main" id="{B1DAC858-59F5-DD4E-AC30-977E0D87D255}"/>
-              </a:ext>
-            </a:extLst>
-          </p:cNvPr>
-          <p:cNvSpPr>
-            <a:spLocks noGrp="1"/>
-          </p:cNvSpPr>
-          <p:nvPr>
-            <p:ph type="dt" sz="half" idx="10"/>
-          </p:nvPr>
-        </p:nvSpPr>
-        <p:spPr/>
-        <p:txBody>
-          <a:bodyPr/>
-          <a:lstStyle/>
-          <a:p>
-            <a:fld id="{241EB5C9-1307-BA42-ABA2-0BC069CD8E7F}" type="datetimeFigureOut">
-              <a:rPr lang="en-US" smtClean="0"/>
-              <a:t>4/7/21</a:t>
-            </a:fld>
-            <a:endParaRPr lang="en-US"/>
-          </a:p>
-        </p:txBody>
-      </p:sp>
-      <p:sp>
-        <p:nvSpPr>
-          <p:cNvPr id="6" name="Footer Placeholder 5">
-            <a:extLst>
-              <a:ext uri="{FF2B5EF4-FFF2-40B4-BE49-F238E27FC236}">
-                <a16:creationId xmlns:a16="http://schemas.microsoft.com/office/drawing/2014/main" id="{E791DBEE-82D8-5B4C-BAEA-D231FABCA8F1}"/>
-              </a:ext>
-            </a:extLst>
-          </p:cNvPr>
-          <p:cNvSpPr>
-            <a:spLocks noGrp="1"/>
-          </p:cNvSpPr>
-          <p:nvPr>
-            <p:ph type="ftr" sz="quarter" idx="11"/>
-          </p:nvPr>
-        </p:nvSpPr>
-        <p:spPr/>
-        <p:txBody>
-          <a:bodyPr/>
-          <a:lstStyle/>
-          <a:p>
-            <a:endParaRPr lang="en-US"/>
-          </a:p>
-        </p:txBody>
-      </p:sp>
-      <p:sp>
-        <p:nvSpPr>
-          <p:cNvPr id="7" name="Slide Number Placeholder 6">
-            <a:extLst>
-              <a:ext uri="{FF2B5EF4-FFF2-40B4-BE49-F238E27FC236}">
-                <a16:creationId xmlns:a16="http://schemas.microsoft.com/office/drawing/2014/main" id="{CD753786-B7AD-6148-A746-116FC6AB0861}"/>
-              </a:ext>
-            </a:extLst>
-          </p:cNvPr>
-          <p:cNvSpPr>
-            <a:spLocks noGrp="1"/>
-          </p:cNvSpPr>
-          <p:nvPr>
-            <p:ph type="sldNum" sz="quarter" idx="12"/>
-          </p:nvPr>
-        </p:nvSpPr>
-        <p:spPr/>
-        <p:txBody>
-          <a:bodyPr/>
-          <a:lstStyle/>
-          <a:p>
-            <a:fld id="{C5EF2332-01BF-834F-8236-50238282D533}" type="slidenum">
-              <a:rPr lang="en-US" smtClean="0"/>
-              <a:t>‹#›</a:t>
-            </a:fld>
-            <a:endParaRPr lang="en-US"/>
-          </a:p>
-        </p:txBody>
-      </p:sp>
-    </p:spTree>
-    <p:extLst>
-      <p:ext uri="{BB962C8B-B14F-4D97-AF65-F5344CB8AC3E}">
-        <p14:creationId xmlns:p14="http://schemas.microsoft.com/office/powerpoint/2010/main" val="3381819082"/>
-      </p:ext>
-    </p:extLst>
-  </p:cSld>
-  <p:clrMapOvr>
-    <a:masterClrMapping/>
-  </p:clrMapOvr>
-</p:sldLayout>
-</file>
-
 <file path=ppt/slideMasters/slideMaster1.xml><?xml version="1.0" encoding="utf-8"?>
 <p:sldMaster xmlns:a="http://schemas.openxmlformats.org/drawingml/2006/main" xmlns:r="http://schemas.openxmlformats.org/officeDocument/2006/relationships" xmlns:p="http://schemas.openxmlformats.org/presentationml/2006/main">
   <p:cSld>
@@ -3465,13 +1794,6 @@
     <p:sldLayoutId id="2147483667" r:id="rId2"/>
     <p:sldLayoutId id="2147483668" r:id="rId3"/>
     <p:sldLayoutId id="2147483669" r:id="rId4"/>
-    <p:sldLayoutId id="2147483670" r:id="rId5"/>
-    <p:sldLayoutId id="2147483671" r:id="rId6"/>
-    <p:sldLayoutId id="2147483672" r:id="rId7"/>
-    <p:sldLayoutId id="2147483673" r:id="rId8"/>
-    <p:sldLayoutId id="2147483674" r:id="rId9"/>
-    <p:sldLayoutId id="2147483675" r:id="rId10"/>
-    <p:sldLayoutId id="2147483676" r:id="rId11"/>
   </p:sldLayoutIdLst>
   <p:txStyles>
     <p:titleStyle>

</xml_diff>